<commit_message>
More refactory, simplified API types with ApiHelper.
</commit_message>
<xml_diff>
--- a/UBoxPackages.pptx
+++ b/UBoxPackages.pptx
@@ -104,6 +104,11 @@
       </a:defRPr>
     </a:lvl9pPr>
   </p:defaultTextStyle>
+  <p:extLst>
+    <p:ext uri="{EFAFB233-063F-42B5-8137-9DF3F51BA10A}">
+      <p15:sldGuideLst xmlns:p15="http://schemas.microsoft.com/office/powerpoint/2012/main"/>
+    </p:ext>
+  </p:extLst>
 </p:presentation>
 </file>
 
@@ -256,7 +261,7 @@
           <a:p>
             <a:fld id="{AE1B2C5D-6084-47D7-B34B-F3E43D1E8E96}" type="datetimeFigureOut">
               <a:rPr lang="en-GB" smtClean="0"/>
-              <a:t>27/10/2021</a:t>
+              <a:t>28/10/2021</a:t>
             </a:fld>
             <a:endParaRPr lang="en-GB"/>
           </a:p>
@@ -456,7 +461,7 @@
           <a:p>
             <a:fld id="{AE1B2C5D-6084-47D7-B34B-F3E43D1E8E96}" type="datetimeFigureOut">
               <a:rPr lang="en-GB" smtClean="0"/>
-              <a:t>27/10/2021</a:t>
+              <a:t>28/10/2021</a:t>
             </a:fld>
             <a:endParaRPr lang="en-GB"/>
           </a:p>
@@ -666,7 +671,7 @@
           <a:p>
             <a:fld id="{AE1B2C5D-6084-47D7-B34B-F3E43D1E8E96}" type="datetimeFigureOut">
               <a:rPr lang="en-GB" smtClean="0"/>
-              <a:t>27/10/2021</a:t>
+              <a:t>28/10/2021</a:t>
             </a:fld>
             <a:endParaRPr lang="en-GB"/>
           </a:p>
@@ -866,7 +871,7 @@
           <a:p>
             <a:fld id="{AE1B2C5D-6084-47D7-B34B-F3E43D1E8E96}" type="datetimeFigureOut">
               <a:rPr lang="en-GB" smtClean="0"/>
-              <a:t>27/10/2021</a:t>
+              <a:t>28/10/2021</a:t>
             </a:fld>
             <a:endParaRPr lang="en-GB"/>
           </a:p>
@@ -1142,7 +1147,7 @@
           <a:p>
             <a:fld id="{AE1B2C5D-6084-47D7-B34B-F3E43D1E8E96}" type="datetimeFigureOut">
               <a:rPr lang="en-GB" smtClean="0"/>
-              <a:t>27/10/2021</a:t>
+              <a:t>28/10/2021</a:t>
             </a:fld>
             <a:endParaRPr lang="en-GB"/>
           </a:p>
@@ -1410,7 +1415,7 @@
           <a:p>
             <a:fld id="{AE1B2C5D-6084-47D7-B34B-F3E43D1E8E96}" type="datetimeFigureOut">
               <a:rPr lang="en-GB" smtClean="0"/>
-              <a:t>27/10/2021</a:t>
+              <a:t>28/10/2021</a:t>
             </a:fld>
             <a:endParaRPr lang="en-GB"/>
           </a:p>
@@ -1825,7 +1830,7 @@
           <a:p>
             <a:fld id="{AE1B2C5D-6084-47D7-B34B-F3E43D1E8E96}" type="datetimeFigureOut">
               <a:rPr lang="en-GB" smtClean="0"/>
-              <a:t>27/10/2021</a:t>
+              <a:t>28/10/2021</a:t>
             </a:fld>
             <a:endParaRPr lang="en-GB"/>
           </a:p>
@@ -1967,7 +1972,7 @@
           <a:p>
             <a:fld id="{AE1B2C5D-6084-47D7-B34B-F3E43D1E8E96}" type="datetimeFigureOut">
               <a:rPr lang="en-GB" smtClean="0"/>
-              <a:t>27/10/2021</a:t>
+              <a:t>28/10/2021</a:t>
             </a:fld>
             <a:endParaRPr lang="en-GB"/>
           </a:p>
@@ -2080,7 +2085,7 @@
           <a:p>
             <a:fld id="{AE1B2C5D-6084-47D7-B34B-F3E43D1E8E96}" type="datetimeFigureOut">
               <a:rPr lang="en-GB" smtClean="0"/>
-              <a:t>27/10/2021</a:t>
+              <a:t>28/10/2021</a:t>
             </a:fld>
             <a:endParaRPr lang="en-GB"/>
           </a:p>
@@ -2393,7 +2398,7 @@
           <a:p>
             <a:fld id="{AE1B2C5D-6084-47D7-B34B-F3E43D1E8E96}" type="datetimeFigureOut">
               <a:rPr lang="en-GB" smtClean="0"/>
-              <a:t>27/10/2021</a:t>
+              <a:t>28/10/2021</a:t>
             </a:fld>
             <a:endParaRPr lang="en-GB"/>
           </a:p>
@@ -2682,7 +2687,7 @@
           <a:p>
             <a:fld id="{AE1B2C5D-6084-47D7-B34B-F3E43D1E8E96}" type="datetimeFigureOut">
               <a:rPr lang="en-GB" smtClean="0"/>
-              <a:t>27/10/2021</a:t>
+              <a:t>28/10/2021</a:t>
             </a:fld>
             <a:endParaRPr lang="en-GB"/>
           </a:p>
@@ -2925,7 +2930,7 @@
           <a:p>
             <a:fld id="{AE1B2C5D-6084-47D7-B34B-F3E43D1E8E96}" type="datetimeFigureOut">
               <a:rPr lang="en-GB" smtClean="0"/>
-              <a:t>27/10/2021</a:t>
+              <a:t>28/10/2021</a:t>
             </a:fld>
             <a:endParaRPr lang="en-GB"/>
           </a:p>
@@ -3356,8 +3361,8 @@
         </p:nvSpPr>
         <p:spPr>
           <a:xfrm>
-            <a:off x="6949959" y="364027"/>
-            <a:ext cx="4535459" cy="1444509"/>
+            <a:off x="6949959" y="364028"/>
+            <a:ext cx="4535459" cy="905080"/>
           </a:xfrm>
           <a:prstGeom prst="rect">
             <a:avLst/>
@@ -3408,8 +3413,8 @@
         </p:nvSpPr>
         <p:spPr>
           <a:xfrm>
-            <a:off x="477116" y="351039"/>
-            <a:ext cx="4535459" cy="1444509"/>
+            <a:off x="477117" y="351039"/>
+            <a:ext cx="4119822" cy="1444509"/>
           </a:xfrm>
           <a:prstGeom prst="rect">
             <a:avLst/>
@@ -3460,8 +3465,8 @@
         </p:nvSpPr>
         <p:spPr>
           <a:xfrm>
-            <a:off x="477116" y="2407053"/>
-            <a:ext cx="5350106" cy="1444509"/>
+            <a:off x="502055" y="2522136"/>
+            <a:ext cx="4119822" cy="1444509"/>
           </a:xfrm>
           <a:prstGeom prst="rect">
             <a:avLst/>
@@ -3635,7 +3640,7 @@
         </p:nvSpPr>
         <p:spPr>
           <a:xfrm>
-            <a:off x="673331" y="2866382"/>
+            <a:off x="698269" y="2981465"/>
             <a:ext cx="744162" cy="195814"/>
           </a:xfrm>
           <a:prstGeom prst="rect">
@@ -3676,7 +3681,7 @@
         </p:nvSpPr>
         <p:spPr>
           <a:xfrm>
-            <a:off x="1662979" y="2866382"/>
+            <a:off x="1687917" y="2981465"/>
             <a:ext cx="744162" cy="195814"/>
           </a:xfrm>
           <a:prstGeom prst="rect">
@@ -3717,7 +3722,7 @@
         </p:nvSpPr>
         <p:spPr>
           <a:xfrm>
-            <a:off x="4055053" y="716157"/>
+            <a:off x="3638720" y="714895"/>
             <a:ext cx="744162" cy="318924"/>
           </a:xfrm>
           <a:prstGeom prst="rect">
@@ -3765,7 +3770,7 @@
         </p:nvSpPr>
         <p:spPr>
           <a:xfrm>
-            <a:off x="2596342" y="2855828"/>
+            <a:off x="2621280" y="2970911"/>
             <a:ext cx="744162" cy="195814"/>
           </a:xfrm>
           <a:prstGeom prst="rect">
@@ -3827,10 +3832,9 @@
           <a:p>
             <a:pPr algn="ctr"/>
             <a:r>
-              <a:rPr lang="en-GB" sz="800" dirty="0" err="1"/>
+              <a:rPr lang="en-GB" sz="800" dirty="0"/>
               <a:t>CoreError</a:t>
             </a:r>
-            <a:endParaRPr lang="en-GB" sz="800" dirty="0"/>
           </a:p>
         </p:txBody>
       </p:sp>
@@ -3848,7 +3852,7 @@
         </p:nvSpPr>
         <p:spPr>
           <a:xfrm>
-            <a:off x="3585990" y="2855828"/>
+            <a:off x="3610928" y="2970911"/>
             <a:ext cx="744162" cy="195814"/>
           </a:xfrm>
           <a:prstGeom prst="rect">
@@ -3889,8 +3893,8 @@
         </p:nvSpPr>
         <p:spPr>
           <a:xfrm>
-            <a:off x="4055053" y="1227548"/>
-            <a:ext cx="744162" cy="442035"/>
+            <a:off x="3638720" y="1226286"/>
+            <a:ext cx="744162" cy="318924"/>
           </a:xfrm>
           <a:prstGeom prst="rect">
             <a:avLst/>
@@ -3911,14 +3915,7 @@
             <a:pPr algn="ctr"/>
             <a:r>
               <a:rPr lang="en-GB" sz="800" dirty="0"/>
-              <a:t>Base</a:t>
-            </a:r>
-          </a:p>
-          <a:p>
-            <a:pPr algn="ctr"/>
-            <a:r>
-              <a:rPr lang="en-GB" sz="800" dirty="0"/>
-              <a:t>Measurement Type</a:t>
+              <a:t>Measurement TypeDictionary</a:t>
             </a:r>
           </a:p>
         </p:txBody>
@@ -3966,10 +3963,10 @@
       </p:sp>
       <p:sp>
         <p:nvSpPr>
-          <p:cNvPr id="18" name="TextBox 17">
-            <a:extLst>
-              <a:ext uri="{FF2B5EF4-FFF2-40B4-BE49-F238E27FC236}">
-                <a16:creationId xmlns:a16="http://schemas.microsoft.com/office/drawing/2014/main" id="{3BACDCB9-3DF8-49D2-AB62-BBE95103FE70}"/>
+          <p:cNvPr id="19" name="TextBox 18">
+            <a:extLst>
+              <a:ext uri="{FF2B5EF4-FFF2-40B4-BE49-F238E27FC236}">
+                <a16:creationId xmlns:a16="http://schemas.microsoft.com/office/drawing/2014/main" id="{809807A4-E6F6-4988-9695-B83B458A5CE8}"/>
               </a:ext>
             </a:extLst>
           </p:cNvPr>
@@ -3979,7 +3976,7 @@
         <p:spPr>
           <a:xfrm>
             <a:off x="8153053" y="714895"/>
-            <a:ext cx="744162" cy="318924"/>
+            <a:ext cx="744162" cy="195814"/>
           </a:xfrm>
           <a:prstGeom prst="rect">
             <a:avLst/>
@@ -4000,24 +3997,17 @@
             <a:pPr algn="ctr"/>
             <a:r>
               <a:rPr lang="en-GB" sz="800" dirty="0"/>
-              <a:t>Base</a:t>
-            </a:r>
-          </a:p>
-          <a:p>
-            <a:pPr algn="ctr"/>
-            <a:r>
-              <a:rPr lang="en-GB" sz="800" dirty="0"/>
-              <a:t>Measurements </a:t>
-            </a:r>
-          </a:p>
-        </p:txBody>
-      </p:sp>
-      <p:sp>
-        <p:nvSpPr>
-          <p:cNvPr id="19" name="TextBox 18">
-            <a:extLst>
-              <a:ext uri="{FF2B5EF4-FFF2-40B4-BE49-F238E27FC236}">
-                <a16:creationId xmlns:a16="http://schemas.microsoft.com/office/drawing/2014/main" id="{809807A4-E6F6-4988-9695-B83B458A5CE8}"/>
+              <a:t>Persistence</a:t>
+            </a:r>
+          </a:p>
+        </p:txBody>
+      </p:sp>
+      <p:sp>
+        <p:nvSpPr>
+          <p:cNvPr id="20" name="TextBox 19">
+            <a:extLst>
+              <a:ext uri="{FF2B5EF4-FFF2-40B4-BE49-F238E27FC236}">
+                <a16:creationId xmlns:a16="http://schemas.microsoft.com/office/drawing/2014/main" id="{412D6538-119C-47D8-BF86-EA246ED3EAE6}"/>
               </a:ext>
             </a:extLst>
           </p:cNvPr>
@@ -4026,8 +4016,8 @@
         </p:nvSpPr>
         <p:spPr>
           <a:xfrm>
-            <a:off x="9217688" y="714895"/>
-            <a:ext cx="744162" cy="195814"/>
+            <a:off x="6949959" y="2522136"/>
+            <a:ext cx="4535459" cy="1444509"/>
           </a:xfrm>
           <a:prstGeom prst="rect">
             <a:avLst/>
@@ -4041,24 +4031,35 @@
         </p:spPr>
         <p:txBody>
           <a:bodyPr wrap="square" lIns="36000" tIns="36000" rIns="36000" bIns="36000" rtlCol="0">
-            <a:spAutoFit/>
+            <a:noAutofit/>
           </a:bodyPr>
           <a:lstStyle/>
           <a:p>
-            <a:pPr algn="ctr"/>
-            <a:r>
-              <a:rPr lang="en-GB" sz="800" dirty="0"/>
-              <a:t>Persistence</a:t>
-            </a:r>
-          </a:p>
-        </p:txBody>
-      </p:sp>
-      <p:sp>
-        <p:nvSpPr>
-          <p:cNvPr id="20" name="TextBox 19">
-            <a:extLst>
-              <a:ext uri="{FF2B5EF4-FFF2-40B4-BE49-F238E27FC236}">
-                <a16:creationId xmlns:a16="http://schemas.microsoft.com/office/drawing/2014/main" id="{412D6538-119C-47D8-BF86-EA246ED3EAE6}"/>
+            <a:r>
+              <a:rPr lang="en-GB" sz="1000" dirty="0"/>
+              <a:t>IO</a:t>
+            </a:r>
+          </a:p>
+          <a:p>
+            <a:endParaRPr lang="en-GB" sz="1000" dirty="0"/>
+          </a:p>
+          <a:p>
+            <a:endParaRPr lang="en-GB" sz="1000" dirty="0"/>
+          </a:p>
+          <a:p>
+            <a:endParaRPr lang="en-GB" sz="1000" dirty="0"/>
+          </a:p>
+          <a:p>
+            <a:endParaRPr lang="en-GB" sz="1000" dirty="0"/>
+          </a:p>
+        </p:txBody>
+      </p:sp>
+      <p:sp>
+        <p:nvSpPr>
+          <p:cNvPr id="21" name="TextBox 20">
+            <a:extLst>
+              <a:ext uri="{FF2B5EF4-FFF2-40B4-BE49-F238E27FC236}">
+                <a16:creationId xmlns:a16="http://schemas.microsoft.com/office/drawing/2014/main" id="{AC195A1B-4BA8-4741-BEC5-C053E8972383}"/>
               </a:ext>
             </a:extLst>
           </p:cNvPr>
@@ -4067,8 +4068,8 @@
         </p:nvSpPr>
         <p:spPr>
           <a:xfrm>
-            <a:off x="6925021" y="2407053"/>
-            <a:ext cx="4535459" cy="1444509"/>
+            <a:off x="7179425" y="2873004"/>
+            <a:ext cx="744162" cy="195814"/>
           </a:xfrm>
           <a:prstGeom prst="rect">
             <a:avLst/>
@@ -4082,35 +4083,24 @@
         </p:spPr>
         <p:txBody>
           <a:bodyPr wrap="square" lIns="36000" tIns="36000" rIns="36000" bIns="36000" rtlCol="0">
-            <a:noAutofit/>
+            <a:spAutoFit/>
           </a:bodyPr>
           <a:lstStyle/>
           <a:p>
-            <a:r>
-              <a:rPr lang="en-GB" sz="1000" dirty="0"/>
-              <a:t>IO</a:t>
-            </a:r>
-          </a:p>
-          <a:p>
-            <a:endParaRPr lang="en-GB" sz="1000" dirty="0"/>
-          </a:p>
-          <a:p>
-            <a:endParaRPr lang="en-GB" sz="1000" dirty="0"/>
-          </a:p>
-          <a:p>
-            <a:endParaRPr lang="en-GB" sz="1000" dirty="0"/>
-          </a:p>
-          <a:p>
-            <a:endParaRPr lang="en-GB" sz="1000" dirty="0"/>
-          </a:p>
-        </p:txBody>
-      </p:sp>
-      <p:sp>
-        <p:nvSpPr>
-          <p:cNvPr id="21" name="TextBox 20">
-            <a:extLst>
-              <a:ext uri="{FF2B5EF4-FFF2-40B4-BE49-F238E27FC236}">
-                <a16:creationId xmlns:a16="http://schemas.microsoft.com/office/drawing/2014/main" id="{AC195A1B-4BA8-4741-BEC5-C053E8972383}"/>
+            <a:pPr algn="ctr"/>
+            <a:r>
+              <a:rPr lang="en-GB" sz="800" dirty="0"/>
+              <a:t>IOPerson</a:t>
+            </a:r>
+          </a:p>
+        </p:txBody>
+      </p:sp>
+      <p:sp>
+        <p:nvSpPr>
+          <p:cNvPr id="22" name="TextBox 21">
+            <a:extLst>
+              <a:ext uri="{FF2B5EF4-FFF2-40B4-BE49-F238E27FC236}">
+                <a16:creationId xmlns:a16="http://schemas.microsoft.com/office/drawing/2014/main" id="{B130B525-CFEB-4445-84CB-49A5A917B503}"/>
               </a:ext>
             </a:extLst>
           </p:cNvPr>
@@ -4119,7 +4109,7 @@
         </p:nvSpPr>
         <p:spPr>
           <a:xfrm>
-            <a:off x="7154487" y="2757921"/>
+            <a:off x="8153053" y="2873004"/>
             <a:ext cx="744162" cy="195814"/>
           </a:xfrm>
           <a:prstGeom prst="rect">
@@ -4140,19 +4130,18 @@
           <a:p>
             <a:pPr algn="ctr"/>
             <a:r>
-              <a:rPr lang="en-GB" sz="800" dirty="0" err="1"/>
-              <a:t>IOPerson</a:t>
-            </a:r>
-            <a:endParaRPr lang="en-GB" sz="800" dirty="0"/>
-          </a:p>
-        </p:txBody>
-      </p:sp>
-      <p:sp>
-        <p:nvSpPr>
-          <p:cNvPr id="22" name="TextBox 21">
-            <a:extLst>
-              <a:ext uri="{FF2B5EF4-FFF2-40B4-BE49-F238E27FC236}">
-                <a16:creationId xmlns:a16="http://schemas.microsoft.com/office/drawing/2014/main" id="{B130B525-CFEB-4445-84CB-49A5A917B503}"/>
+              <a:rPr lang="en-GB" sz="800" dirty="0"/>
+              <a:t>IOObservation</a:t>
+            </a:r>
+          </a:p>
+        </p:txBody>
+      </p:sp>
+      <p:sp>
+        <p:nvSpPr>
+          <p:cNvPr id="23" name="TextBox 22">
+            <a:extLst>
+              <a:ext uri="{FF2B5EF4-FFF2-40B4-BE49-F238E27FC236}">
+                <a16:creationId xmlns:a16="http://schemas.microsoft.com/office/drawing/2014/main" id="{C7C0F5B0-EB62-49AE-A6E4-ECFBE8ACE65E}"/>
               </a:ext>
             </a:extLst>
           </p:cNvPr>
@@ -4161,7 +4150,7 @@
         </p:nvSpPr>
         <p:spPr>
           <a:xfrm>
-            <a:off x="8128115" y="2757921"/>
+            <a:off x="9126681" y="2873004"/>
             <a:ext cx="744162" cy="195814"/>
           </a:xfrm>
           <a:prstGeom prst="rect">
@@ -4182,19 +4171,18 @@
           <a:p>
             <a:pPr algn="ctr"/>
             <a:r>
-              <a:rPr lang="en-GB" sz="800" dirty="0" err="1"/>
-              <a:t>IOObservation</a:t>
-            </a:r>
-            <a:endParaRPr lang="en-GB" sz="800" dirty="0"/>
-          </a:p>
-        </p:txBody>
-      </p:sp>
-      <p:sp>
-        <p:nvSpPr>
-          <p:cNvPr id="23" name="TextBox 22">
-            <a:extLst>
-              <a:ext uri="{FF2B5EF4-FFF2-40B4-BE49-F238E27FC236}">
-                <a16:creationId xmlns:a16="http://schemas.microsoft.com/office/drawing/2014/main" id="{C7C0F5B0-EB62-49AE-A6E4-ECFBE8ACE65E}"/>
+              <a:rPr lang="en-GB" sz="800" dirty="0"/>
+              <a:t>IOCohort</a:t>
+            </a:r>
+          </a:p>
+        </p:txBody>
+      </p:sp>
+      <p:sp>
+        <p:nvSpPr>
+          <p:cNvPr id="24" name="TextBox 23">
+            <a:extLst>
+              <a:ext uri="{FF2B5EF4-FFF2-40B4-BE49-F238E27FC236}">
+                <a16:creationId xmlns:a16="http://schemas.microsoft.com/office/drawing/2014/main" id="{2E649B5A-4A41-4DE6-8375-0D205F0A441F}"/>
               </a:ext>
             </a:extLst>
           </p:cNvPr>
@@ -4203,49 +4191,7 @@
         </p:nvSpPr>
         <p:spPr>
           <a:xfrm>
-            <a:off x="9101743" y="2757921"/>
-            <a:ext cx="744162" cy="195814"/>
-          </a:xfrm>
-          <a:prstGeom prst="rect">
-            <a:avLst/>
-          </a:prstGeom>
-          <a:noFill/>
-          <a:ln>
-            <a:solidFill>
-              <a:schemeClr val="tx1"/>
-            </a:solidFill>
-          </a:ln>
-        </p:spPr>
-        <p:txBody>
-          <a:bodyPr wrap="square" lIns="36000" tIns="36000" rIns="36000" bIns="36000" rtlCol="0">
-            <a:spAutoFit/>
-          </a:bodyPr>
-          <a:lstStyle/>
-          <a:p>
-            <a:pPr algn="ctr"/>
-            <a:r>
-              <a:rPr lang="en-GB" sz="800" dirty="0" err="1"/>
-              <a:t>IOCohort</a:t>
-            </a:r>
-            <a:endParaRPr lang="en-GB" sz="800" dirty="0"/>
-          </a:p>
-        </p:txBody>
-      </p:sp>
-      <p:sp>
-        <p:nvSpPr>
-          <p:cNvPr id="24" name="TextBox 23">
-            <a:extLst>
-              <a:ext uri="{FF2B5EF4-FFF2-40B4-BE49-F238E27FC236}">
-                <a16:creationId xmlns:a16="http://schemas.microsoft.com/office/drawing/2014/main" id="{2E649B5A-4A41-4DE6-8375-0D205F0A441F}"/>
-              </a:ext>
-            </a:extLst>
-          </p:cNvPr>
-          <p:cNvSpPr txBox="1"/>
-          <p:nvPr/>
-        </p:nvSpPr>
-        <p:spPr>
-          <a:xfrm>
-            <a:off x="10075371" y="2757921"/>
+            <a:off x="10100309" y="2873004"/>
             <a:ext cx="744162" cy="195814"/>
           </a:xfrm>
           <a:prstGeom prst="rect">
@@ -4267,10 +4213,9 @@
           <a:p>
             <a:pPr algn="ctr"/>
             <a:r>
-              <a:rPr lang="en-GB" sz="800" dirty="0" err="1"/>
+              <a:rPr lang="en-GB" sz="800" dirty="0"/>
               <a:t>IOBusiness</a:t>
             </a:r>
-            <a:endParaRPr lang="en-GB" sz="800" dirty="0"/>
           </a:p>
         </p:txBody>
       </p:sp>
@@ -4288,7 +4233,7 @@
         </p:nvSpPr>
         <p:spPr>
           <a:xfrm>
-            <a:off x="10282323" y="714895"/>
+            <a:off x="9126681" y="714895"/>
             <a:ext cx="744162" cy="195814"/>
           </a:xfrm>
           <a:prstGeom prst="rect">
@@ -4350,10 +4295,9 @@
           <a:p>
             <a:pPr algn="ctr"/>
             <a:r>
-              <a:rPr lang="en-GB" sz="800" dirty="0" err="1"/>
+              <a:rPr lang="en-GB" sz="800" dirty="0"/>
               <a:t>Url</a:t>
             </a:r>
-            <a:endParaRPr lang="en-GB" sz="800" dirty="0"/>
           </a:p>
         </p:txBody>
       </p:sp>
@@ -4433,10 +4377,9 @@
           <a:p>
             <a:pPr algn="ctr"/>
             <a:r>
-              <a:rPr lang="en-GB" sz="800" dirty="0" err="1"/>
+              <a:rPr lang="en-GB" sz="800" dirty="0"/>
               <a:t>EmailAddress</a:t>
             </a:r>
-            <a:endParaRPr lang="en-GB" sz="800" dirty="0"/>
           </a:p>
         </p:txBody>
       </p:sp>
@@ -4475,10 +4418,9 @@
           <a:p>
             <a:pPr algn="ctr"/>
             <a:r>
-              <a:rPr lang="en-GB" sz="800" dirty="0" err="1"/>
+              <a:rPr lang="en-GB" sz="800" dirty="0"/>
               <a:t>LoginDetails</a:t>
             </a:r>
-            <a:endParaRPr lang="en-GB" sz="800" dirty="0"/>
           </a:p>
         </p:txBody>
       </p:sp>
@@ -4520,6 +4462,227 @@
               <a:rPr lang="en-GB" sz="800" dirty="0"/>
               <a:t>Roles</a:t>
             </a:r>
+          </a:p>
+        </p:txBody>
+      </p:sp>
+      <p:sp>
+        <p:nvSpPr>
+          <p:cNvPr id="31" name="TextBox 30">
+            <a:extLst>
+              <a:ext uri="{FF2B5EF4-FFF2-40B4-BE49-F238E27FC236}">
+                <a16:creationId xmlns:a16="http://schemas.microsoft.com/office/drawing/2014/main" id="{A03FBB37-80C9-4D99-9B28-C9764AC9D5D9}"/>
+              </a:ext>
+            </a:extLst>
+          </p:cNvPr>
+          <p:cNvSpPr txBox="1"/>
+          <p:nvPr/>
+        </p:nvSpPr>
+        <p:spPr>
+          <a:xfrm>
+            <a:off x="6949959" y="5084704"/>
+            <a:ext cx="4535459" cy="905080"/>
+          </a:xfrm>
+          <a:prstGeom prst="rect">
+            <a:avLst/>
+          </a:prstGeom>
+          <a:noFill/>
+          <a:ln>
+            <a:solidFill>
+              <a:schemeClr val="tx1"/>
+            </a:solidFill>
+          </a:ln>
+        </p:spPr>
+        <p:txBody>
+          <a:bodyPr wrap="square" lIns="36000" tIns="36000" rIns="36000" bIns="36000" rtlCol="0">
+            <a:noAutofit/>
+          </a:bodyPr>
+          <a:lstStyle/>
+          <a:p>
+            <a:r>
+              <a:rPr lang="en-GB" sz="1000" dirty="0"/>
+              <a:t>DB/Server</a:t>
+            </a:r>
+          </a:p>
+          <a:p>
+            <a:endParaRPr lang="en-GB" sz="1000" dirty="0"/>
+          </a:p>
+          <a:p>
+            <a:endParaRPr lang="en-GB" sz="1000" dirty="0"/>
+          </a:p>
+          <a:p>
+            <a:endParaRPr lang="en-GB" sz="1000" dirty="0"/>
+          </a:p>
+          <a:p>
+            <a:endParaRPr lang="en-GB" sz="1000" dirty="0"/>
+          </a:p>
+        </p:txBody>
+      </p:sp>
+      <p:sp>
+        <p:nvSpPr>
+          <p:cNvPr id="32" name="TextBox 31">
+            <a:extLst>
+              <a:ext uri="{FF2B5EF4-FFF2-40B4-BE49-F238E27FC236}">
+                <a16:creationId xmlns:a16="http://schemas.microsoft.com/office/drawing/2014/main" id="{F735AC56-A770-45C5-8A4D-A2CF8DF830FA}"/>
+              </a:ext>
+            </a:extLst>
+          </p:cNvPr>
+          <p:cNvSpPr txBox="1"/>
+          <p:nvPr/>
+        </p:nvSpPr>
+        <p:spPr>
+          <a:xfrm>
+            <a:off x="7179425" y="5404578"/>
+            <a:ext cx="744162" cy="195814"/>
+          </a:xfrm>
+          <a:prstGeom prst="rect">
+            <a:avLst/>
+          </a:prstGeom>
+          <a:noFill/>
+          <a:ln>
+            <a:solidFill>
+              <a:schemeClr val="tx1"/>
+            </a:solidFill>
+          </a:ln>
+        </p:spPr>
+        <p:txBody>
+          <a:bodyPr wrap="square" lIns="36000" tIns="36000" rIns="36000" bIns="36000" rtlCol="0">
+            <a:spAutoFit/>
+          </a:bodyPr>
+          <a:lstStyle/>
+          <a:p>
+            <a:pPr algn="ctr"/>
+            <a:r>
+              <a:rPr lang="en-GB" sz="800" dirty="0" err="1"/>
+              <a:t>PersonDb</a:t>
+            </a:r>
+            <a:endParaRPr lang="en-GB" sz="800" dirty="0"/>
+          </a:p>
+        </p:txBody>
+      </p:sp>
+      <p:sp>
+        <p:nvSpPr>
+          <p:cNvPr id="33" name="TextBox 32">
+            <a:extLst>
+              <a:ext uri="{FF2B5EF4-FFF2-40B4-BE49-F238E27FC236}">
+                <a16:creationId xmlns:a16="http://schemas.microsoft.com/office/drawing/2014/main" id="{E5A6A74A-7BEA-4C9D-9EDE-6741DE126D18}"/>
+              </a:ext>
+            </a:extLst>
+          </p:cNvPr>
+          <p:cNvSpPr txBox="1"/>
+          <p:nvPr/>
+        </p:nvSpPr>
+        <p:spPr>
+          <a:xfrm>
+            <a:off x="8153053" y="5404578"/>
+            <a:ext cx="744162" cy="195814"/>
+          </a:xfrm>
+          <a:prstGeom prst="rect">
+            <a:avLst/>
+          </a:prstGeom>
+          <a:noFill/>
+          <a:ln>
+            <a:solidFill>
+              <a:schemeClr val="tx1"/>
+            </a:solidFill>
+          </a:ln>
+        </p:spPr>
+        <p:txBody>
+          <a:bodyPr wrap="square" lIns="36000" tIns="36000" rIns="36000" bIns="36000" rtlCol="0">
+            <a:spAutoFit/>
+          </a:bodyPr>
+          <a:lstStyle/>
+          <a:p>
+            <a:pPr algn="ctr"/>
+            <a:r>
+              <a:rPr lang="en-GB" sz="800" dirty="0" err="1"/>
+              <a:t>ObservationDb</a:t>
+            </a:r>
+            <a:endParaRPr lang="en-GB" sz="800" dirty="0"/>
+          </a:p>
+        </p:txBody>
+      </p:sp>
+      <p:sp>
+        <p:nvSpPr>
+          <p:cNvPr id="34" name="TextBox 33">
+            <a:extLst>
+              <a:ext uri="{FF2B5EF4-FFF2-40B4-BE49-F238E27FC236}">
+                <a16:creationId xmlns:a16="http://schemas.microsoft.com/office/drawing/2014/main" id="{ABA2174C-3AF0-4E1C-A304-1796692E8DC3}"/>
+              </a:ext>
+            </a:extLst>
+          </p:cNvPr>
+          <p:cNvSpPr txBox="1"/>
+          <p:nvPr/>
+        </p:nvSpPr>
+        <p:spPr>
+          <a:xfrm>
+            <a:off x="9126681" y="5404578"/>
+            <a:ext cx="744162" cy="195814"/>
+          </a:xfrm>
+          <a:prstGeom prst="rect">
+            <a:avLst/>
+          </a:prstGeom>
+          <a:noFill/>
+          <a:ln>
+            <a:solidFill>
+              <a:schemeClr val="tx1"/>
+            </a:solidFill>
+          </a:ln>
+        </p:spPr>
+        <p:txBody>
+          <a:bodyPr wrap="square" lIns="36000" tIns="36000" rIns="36000" bIns="36000" rtlCol="0">
+            <a:spAutoFit/>
+          </a:bodyPr>
+          <a:lstStyle/>
+          <a:p>
+            <a:pPr algn="ctr"/>
+            <a:r>
+              <a:rPr lang="en-GB" sz="800" dirty="0" err="1"/>
+              <a:t>CohortDb</a:t>
+            </a:r>
+            <a:endParaRPr lang="en-GB" sz="800" dirty="0"/>
+          </a:p>
+        </p:txBody>
+      </p:sp>
+      <p:sp>
+        <p:nvSpPr>
+          <p:cNvPr id="35" name="TextBox 34">
+            <a:extLst>
+              <a:ext uri="{FF2B5EF4-FFF2-40B4-BE49-F238E27FC236}">
+                <a16:creationId xmlns:a16="http://schemas.microsoft.com/office/drawing/2014/main" id="{72B7940F-F734-424A-BEEA-9FEC153A2950}"/>
+              </a:ext>
+            </a:extLst>
+          </p:cNvPr>
+          <p:cNvSpPr txBox="1"/>
+          <p:nvPr/>
+        </p:nvSpPr>
+        <p:spPr>
+          <a:xfrm>
+            <a:off x="10100309" y="5404578"/>
+            <a:ext cx="744162" cy="195814"/>
+          </a:xfrm>
+          <a:prstGeom prst="rect">
+            <a:avLst/>
+          </a:prstGeom>
+          <a:noFill/>
+          <a:ln>
+            <a:solidFill>
+              <a:schemeClr val="tx1"/>
+            </a:solidFill>
+            <a:prstDash val="sysDash"/>
+          </a:ln>
+        </p:spPr>
+        <p:txBody>
+          <a:bodyPr wrap="square" lIns="36000" tIns="36000" rIns="36000" bIns="36000" rtlCol="0">
+            <a:spAutoFit/>
+          </a:bodyPr>
+          <a:lstStyle/>
+          <a:p>
+            <a:pPr algn="ctr"/>
+            <a:r>
+              <a:rPr lang="en-GB" sz="800" dirty="0" err="1"/>
+              <a:t>BusinessDb</a:t>
+            </a:r>
+            <a:endParaRPr lang="en-GB" sz="800" dirty="0"/>
           </a:p>
         </p:txBody>
       </p:sp>

</xml_diff>